<commit_message>
update Cofor CGE 2025
</commit_message>
<xml_diff>
--- a/Presentations/2025_CoFor_CGE_2024_2025.pptx
+++ b/Presentations/2025_CoFor_CGE_2024_2025.pptx
@@ -6,10 +6,10 @@
     <p:sldMasterId id="2147483664" r:id="rId2"/>
   </p:sldMasterIdLst>
   <p:notesMasterIdLst>
-    <p:notesMasterId r:id="rId14"/>
+    <p:notesMasterId r:id="rId15"/>
   </p:notesMasterIdLst>
   <p:handoutMasterIdLst>
-    <p:handoutMasterId r:id="rId15"/>
+    <p:handoutMasterId r:id="rId16"/>
   </p:handoutMasterIdLst>
   <p:sldIdLst>
     <p:sldId id="314" r:id="rId3"/>
@@ -21,8 +21,9 @@
     <p:sldId id="333" r:id="rId9"/>
     <p:sldId id="328" r:id="rId10"/>
     <p:sldId id="330" r:id="rId11"/>
-    <p:sldId id="331" r:id="rId12"/>
-    <p:sldId id="332" r:id="rId13"/>
+    <p:sldId id="335" r:id="rId12"/>
+    <p:sldId id="331" r:id="rId13"/>
+    <p:sldId id="332" r:id="rId14"/>
   </p:sldIdLst>
   <p:sldSz cx="12192000" cy="6858000"/>
   <p:notesSz cx="6797675" cy="9928225"/>
@@ -165,6 +166,7 @@
             <p14:sldId id="333"/>
             <p14:sldId id="328"/>
             <p14:sldId id="330"/>
+            <p14:sldId id="335"/>
             <p14:sldId id="331"/>
             <p14:sldId id="332"/>
           </p14:sldIdLst>
@@ -529,7 +531,7 @@
               </a14:hiddenFill>
             </a:ext>
             <a:ext uri="{FAA26D3D-D897-4be2-8F04-BA451C77F1D7}">
-              <ma14:placeholderFlag xmlns:ma14="http://schemas.microsoft.com/office/mac/drawingml/2011/main" xmlns="" val="1"/>
+              <ma14:placeholderFlag xmlns="" xmlns:ma14="http://schemas.microsoft.com/office/mac/drawingml/2011/main" val="1"/>
             </a:ext>
           </a:extLst>
         </p:spPr>
@@ -851,7 +853,7 @@
             <a:fld id="{C5D8CFC6-2EE8-4043-8C44-71F3876B9617}" type="slidenum">
               <a:rPr lang="fr-FR" smtClean="0"/>
               <a:pPr/>
-              <a:t>10</a:t>
+              <a:t>11</a:t>
             </a:fld>
             <a:endParaRPr lang="fr-FR"/>
           </a:p>
@@ -960,7 +962,7 @@
             <a:fld id="{C5D8CFC6-2EE8-4043-8C44-71F3876B9617}" type="slidenum">
               <a:rPr lang="fr-FR" smtClean="0"/>
               <a:pPr/>
-              <a:t>11</a:t>
+              <a:t>12</a:t>
             </a:fld>
             <a:endParaRPr lang="fr-FR"/>
           </a:p>
@@ -6330,7 +6332,7 @@
         <p:cNvPr id="1" name="">
           <a:extLst>
             <a:ext uri="{FF2B5EF4-FFF2-40B4-BE49-F238E27FC236}">
-              <a16:creationId xmlns:a16="http://schemas.microsoft.com/office/drawing/2014/main" id="{B99C7A6B-25F1-8A81-A738-5B913CD7B6C3}"/>
+              <a16:creationId xmlns:a16="http://schemas.microsoft.com/office/drawing/2014/main" id="{24A01512-AFF4-EBFD-6687-F24BC11423F1}"/>
             </a:ext>
           </a:extLst>
         </p:cNvPr>
@@ -6350,7 +6352,7 @@
           <p:cNvPr id="2" name="Titre 1">
             <a:extLst>
               <a:ext uri="{FF2B5EF4-FFF2-40B4-BE49-F238E27FC236}">
-                <a16:creationId xmlns:a16="http://schemas.microsoft.com/office/drawing/2014/main" id="{4EA00DEE-C22F-33FE-F07B-4EE96DE2C194}"/>
+                <a16:creationId xmlns:a16="http://schemas.microsoft.com/office/drawing/2014/main" id="{7C9D3050-BF33-8142-37EF-39811DF9200A}"/>
               </a:ext>
             </a:extLst>
           </p:cNvPr>
@@ -6378,7 +6380,7 @@
           <p:cNvPr id="7" name="Flèche : chevron 6">
             <a:extLst>
               <a:ext uri="{FF2B5EF4-FFF2-40B4-BE49-F238E27FC236}">
-                <a16:creationId xmlns:a16="http://schemas.microsoft.com/office/drawing/2014/main" id="{780EF0C3-7563-428D-D529-FF58B0110316}"/>
+                <a16:creationId xmlns:a16="http://schemas.microsoft.com/office/drawing/2014/main" id="{337524C9-C744-5D4D-6C04-18B1020A8FD8}"/>
               </a:ext>
             </a:extLst>
           </p:cNvPr>
@@ -6452,17 +6454,47 @@
                 <a:latin typeface="Arial" charset="0"/>
                 <a:ea typeface="ＭＳ Ｐゴシック" pitchFamily="1" charset="-128"/>
               </a:rPr>
-              <a:t>RSE</a:t>
-            </a:r>
-          </a:p>
-        </p:txBody>
-      </p:sp>
-      <p:sp>
-        <p:nvSpPr>
-          <p:cNvPr id="17" name="Rectangle : coins arrondis 16">
-            <a:extLst>
-              <a:ext uri="{FF2B5EF4-FFF2-40B4-BE49-F238E27FC236}">
-                <a16:creationId xmlns:a16="http://schemas.microsoft.com/office/drawing/2014/main" id="{2BFBCB5B-C8BA-8032-F9B5-B47991EFD838}"/>
+              <a:t>Apprentis</a:t>
+            </a:r>
+          </a:p>
+        </p:txBody>
+      </p:sp>
+      <p:pic>
+        <p:nvPicPr>
+          <p:cNvPr id="4" name="Image 3">
+            <a:extLst>
+              <a:ext uri="{FF2B5EF4-FFF2-40B4-BE49-F238E27FC236}">
+                <a16:creationId xmlns:a16="http://schemas.microsoft.com/office/drawing/2014/main" id="{A491F0FC-C933-445B-ACC4-1B44F5D45C19}"/>
+              </a:ext>
+            </a:extLst>
+          </p:cNvPr>
+          <p:cNvPicPr>
+            <a:picLocks noChangeAspect="1"/>
+          </p:cNvPicPr>
+          <p:nvPr/>
+        </p:nvPicPr>
+        <p:blipFill>
+          <a:blip r:embed="rId2"/>
+          <a:stretch>
+            <a:fillRect/>
+          </a:stretch>
+        </p:blipFill>
+        <p:spPr>
+          <a:xfrm>
+            <a:off x="8525276" y="1828231"/>
+            <a:ext cx="3354685" cy="2604569"/>
+          </a:xfrm>
+          <a:prstGeom prst="rect">
+            <a:avLst/>
+          </a:prstGeom>
+        </p:spPr>
+      </p:pic>
+      <p:sp>
+        <p:nvSpPr>
+          <p:cNvPr id="5" name="Rectangle : coins arrondis 4">
+            <a:extLst>
+              <a:ext uri="{FF2B5EF4-FFF2-40B4-BE49-F238E27FC236}">
+                <a16:creationId xmlns:a16="http://schemas.microsoft.com/office/drawing/2014/main" id="{75530B23-D754-3773-1D76-695B1B73C3C5}"/>
               </a:ext>
             </a:extLst>
           </p:cNvPr>
@@ -6471,8 +6503,8 @@
         </p:nvSpPr>
         <p:spPr bwMode="auto">
           <a:xfrm>
-            <a:off x="9048328" y="1585795"/>
-            <a:ext cx="2214377" cy="461665"/>
+            <a:off x="3903987" y="2204864"/>
+            <a:ext cx="1683040" cy="307777"/>
           </a:xfrm>
           <a:prstGeom prst="roundRect">
             <a:avLst/>
@@ -6525,6 +6557,1170 @@
                 <a:latin typeface="Calibri" panose="020F0502020204030204" pitchFamily="34" charset="0"/>
                 <a:ea typeface="MS PGothic" pitchFamily="34" charset="-128"/>
               </a:rPr>
+              <a:t>FISA</a:t>
+            </a:r>
+            <a:endParaRPr kumimoji="0" lang="fr-FR" sz="1800" b="0" i="0" u="none" strike="noStrike" cap="none" normalizeH="0" baseline="0" dirty="0">
+              <a:ln>
+                <a:noFill/>
+              </a:ln>
+              <a:solidFill>
+                <a:srgbClr val="FFFFFF"/>
+              </a:solidFill>
+              <a:effectLst/>
+              <a:latin typeface="Arial" charset="0"/>
+              <a:ea typeface="MS PGothic" pitchFamily="34" charset="-128"/>
+            </a:endParaRPr>
+          </a:p>
+        </p:txBody>
+      </p:sp>
+      <p:sp>
+        <p:nvSpPr>
+          <p:cNvPr id="8" name="ZoneTexte 7">
+            <a:extLst>
+              <a:ext uri="{FF2B5EF4-FFF2-40B4-BE49-F238E27FC236}">
+                <a16:creationId xmlns:a16="http://schemas.microsoft.com/office/drawing/2014/main" id="{63ECD837-BB02-3682-5C40-FD0A8F5CCE2F}"/>
+              </a:ext>
+            </a:extLst>
+          </p:cNvPr>
+          <p:cNvSpPr txBox="1"/>
+          <p:nvPr/>
+        </p:nvSpPr>
+        <p:spPr>
+          <a:xfrm>
+            <a:off x="1487488" y="2693504"/>
+            <a:ext cx="1728192" cy="338554"/>
+          </a:xfrm>
+          <a:prstGeom prst="rect">
+            <a:avLst/>
+          </a:prstGeom>
+          <a:noFill/>
+        </p:spPr>
+        <p:txBody>
+          <a:bodyPr wrap="square">
+            <a:spAutoFit/>
+          </a:bodyPr>
+          <a:lstStyle/>
+          <a:p>
+            <a:r>
+              <a:rPr lang="fr-FR" dirty="0">
+                <a:solidFill>
+                  <a:srgbClr val="333333"/>
+                </a:solidFill>
+                <a:latin typeface="Calibri" panose="020F0502020204030204" pitchFamily="34" charset="0"/>
+              </a:rPr>
+              <a:t>En activité</a:t>
+            </a:r>
+            <a:endParaRPr lang="fr-FR" dirty="0"/>
+          </a:p>
+        </p:txBody>
+      </p:sp>
+      <p:sp>
+        <p:nvSpPr>
+          <p:cNvPr id="9" name="ZoneTexte 8">
+            <a:extLst>
+              <a:ext uri="{FF2B5EF4-FFF2-40B4-BE49-F238E27FC236}">
+                <a16:creationId xmlns:a16="http://schemas.microsoft.com/office/drawing/2014/main" id="{A6E9CF98-99D8-D552-7E5D-A415B26737A5}"/>
+              </a:ext>
+            </a:extLst>
+          </p:cNvPr>
+          <p:cNvSpPr txBox="1"/>
+          <p:nvPr/>
+        </p:nvSpPr>
+        <p:spPr>
+          <a:xfrm>
+            <a:off x="1487488" y="3109623"/>
+            <a:ext cx="2160240" cy="338554"/>
+          </a:xfrm>
+          <a:prstGeom prst="rect">
+            <a:avLst/>
+          </a:prstGeom>
+          <a:noFill/>
+        </p:spPr>
+        <p:txBody>
+          <a:bodyPr wrap="square">
+            <a:spAutoFit/>
+          </a:bodyPr>
+          <a:lstStyle/>
+          <a:p>
+            <a:r>
+              <a:rPr lang="fr-FR" dirty="0">
+                <a:solidFill>
+                  <a:srgbClr val="333333"/>
+                </a:solidFill>
+                <a:latin typeface="Calibri" panose="020F0502020204030204" pitchFamily="34" charset="0"/>
+              </a:rPr>
+              <a:t>En recherche emploi</a:t>
+            </a:r>
+            <a:endParaRPr lang="fr-FR" dirty="0"/>
+          </a:p>
+        </p:txBody>
+      </p:sp>
+      <p:sp>
+        <p:nvSpPr>
+          <p:cNvPr id="10" name="ZoneTexte 9">
+            <a:extLst>
+              <a:ext uri="{FF2B5EF4-FFF2-40B4-BE49-F238E27FC236}">
+                <a16:creationId xmlns:a16="http://schemas.microsoft.com/office/drawing/2014/main" id="{462411E9-4359-0328-BD60-365109B028CE}"/>
+              </a:ext>
+            </a:extLst>
+          </p:cNvPr>
+          <p:cNvSpPr txBox="1"/>
+          <p:nvPr/>
+        </p:nvSpPr>
+        <p:spPr>
+          <a:xfrm>
+            <a:off x="1487488" y="3469070"/>
+            <a:ext cx="2160240" cy="338554"/>
+          </a:xfrm>
+          <a:prstGeom prst="rect">
+            <a:avLst/>
+          </a:prstGeom>
+          <a:noFill/>
+        </p:spPr>
+        <p:txBody>
+          <a:bodyPr wrap="square">
+            <a:spAutoFit/>
+          </a:bodyPr>
+          <a:lstStyle/>
+          <a:p>
+            <a:r>
+              <a:rPr lang="fr-FR" dirty="0">
+                <a:solidFill>
+                  <a:srgbClr val="333333"/>
+                </a:solidFill>
+                <a:latin typeface="Calibri" panose="020F0502020204030204" pitchFamily="34" charset="0"/>
+              </a:rPr>
+              <a:t>En thèse</a:t>
+            </a:r>
+            <a:endParaRPr lang="fr-FR" dirty="0"/>
+          </a:p>
+        </p:txBody>
+      </p:sp>
+      <p:sp>
+        <p:nvSpPr>
+          <p:cNvPr id="11" name="ZoneTexte 10">
+            <a:extLst>
+              <a:ext uri="{FF2B5EF4-FFF2-40B4-BE49-F238E27FC236}">
+                <a16:creationId xmlns:a16="http://schemas.microsoft.com/office/drawing/2014/main" id="{AB20AB41-461B-19D3-C7EE-EA408B5C92A8}"/>
+              </a:ext>
+            </a:extLst>
+          </p:cNvPr>
+          <p:cNvSpPr txBox="1"/>
+          <p:nvPr/>
+        </p:nvSpPr>
+        <p:spPr>
+          <a:xfrm>
+            <a:off x="1487488" y="3828517"/>
+            <a:ext cx="2160240" cy="338554"/>
+          </a:xfrm>
+          <a:prstGeom prst="rect">
+            <a:avLst/>
+          </a:prstGeom>
+          <a:noFill/>
+        </p:spPr>
+        <p:txBody>
+          <a:bodyPr wrap="square">
+            <a:spAutoFit/>
+          </a:bodyPr>
+          <a:lstStyle/>
+          <a:p>
+            <a:r>
+              <a:rPr lang="fr-FR" dirty="0">
+                <a:solidFill>
+                  <a:srgbClr val="333333"/>
+                </a:solidFill>
+                <a:latin typeface="Calibri" panose="020F0502020204030204" pitchFamily="34" charset="0"/>
+              </a:rPr>
+              <a:t>En études</a:t>
+            </a:r>
+            <a:endParaRPr lang="fr-FR" dirty="0"/>
+          </a:p>
+        </p:txBody>
+      </p:sp>
+      <p:sp>
+        <p:nvSpPr>
+          <p:cNvPr id="13" name="ZoneTexte 12">
+            <a:extLst>
+              <a:ext uri="{FF2B5EF4-FFF2-40B4-BE49-F238E27FC236}">
+                <a16:creationId xmlns:a16="http://schemas.microsoft.com/office/drawing/2014/main" id="{E16B1552-0940-3EDB-617C-D9EDDCE69138}"/>
+              </a:ext>
+            </a:extLst>
+          </p:cNvPr>
+          <p:cNvSpPr txBox="1"/>
+          <p:nvPr/>
+        </p:nvSpPr>
+        <p:spPr>
+          <a:xfrm>
+            <a:off x="1127448" y="2032920"/>
+            <a:ext cx="3096344" cy="307777"/>
+          </a:xfrm>
+          <a:prstGeom prst="rect">
+            <a:avLst/>
+          </a:prstGeom>
+          <a:noFill/>
+        </p:spPr>
+        <p:txBody>
+          <a:bodyPr wrap="square">
+            <a:spAutoFit/>
+          </a:bodyPr>
+          <a:lstStyle/>
+          <a:p>
+            <a:r>
+              <a:rPr lang="fr-FR" sz="1400" b="1" dirty="0">
+                <a:solidFill>
+                  <a:srgbClr val="333333"/>
+                </a:solidFill>
+                <a:latin typeface="Calibri" panose="020F0502020204030204" pitchFamily="34" charset="0"/>
+              </a:rPr>
+              <a:t>11 réponses / 84        -  13 %</a:t>
+            </a:r>
+            <a:endParaRPr lang="fr-FR" sz="1400" b="1" dirty="0"/>
+          </a:p>
+        </p:txBody>
+      </p:sp>
+      <p:sp>
+        <p:nvSpPr>
+          <p:cNvPr id="14" name="ZoneTexte 13">
+            <a:extLst>
+              <a:ext uri="{FF2B5EF4-FFF2-40B4-BE49-F238E27FC236}">
+                <a16:creationId xmlns:a16="http://schemas.microsoft.com/office/drawing/2014/main" id="{B1BCEF54-DE03-C923-7EBC-CBD077C1443E}"/>
+              </a:ext>
+            </a:extLst>
+          </p:cNvPr>
+          <p:cNvSpPr txBox="1"/>
+          <p:nvPr/>
+        </p:nvSpPr>
+        <p:spPr>
+          <a:xfrm>
+            <a:off x="3935760" y="2636912"/>
+            <a:ext cx="1728192" cy="338554"/>
+          </a:xfrm>
+          <a:prstGeom prst="rect">
+            <a:avLst/>
+          </a:prstGeom>
+          <a:noFill/>
+        </p:spPr>
+        <p:txBody>
+          <a:bodyPr wrap="square">
+            <a:spAutoFit/>
+          </a:bodyPr>
+          <a:lstStyle/>
+          <a:p>
+            <a:r>
+              <a:rPr lang="fr-FR" dirty="0">
+                <a:solidFill>
+                  <a:srgbClr val="333333"/>
+                </a:solidFill>
+                <a:latin typeface="Calibri" panose="020F0502020204030204" pitchFamily="34" charset="0"/>
+              </a:rPr>
+              <a:t>4 / 11         36 %</a:t>
+            </a:r>
+            <a:endParaRPr lang="fr-FR" dirty="0"/>
+          </a:p>
+        </p:txBody>
+      </p:sp>
+      <p:sp>
+        <p:nvSpPr>
+          <p:cNvPr id="15" name="ZoneTexte 14">
+            <a:extLst>
+              <a:ext uri="{FF2B5EF4-FFF2-40B4-BE49-F238E27FC236}">
+                <a16:creationId xmlns:a16="http://schemas.microsoft.com/office/drawing/2014/main" id="{084D1305-FB7D-9901-0C64-3EB16298EDF8}"/>
+              </a:ext>
+            </a:extLst>
+          </p:cNvPr>
+          <p:cNvSpPr txBox="1"/>
+          <p:nvPr/>
+        </p:nvSpPr>
+        <p:spPr>
+          <a:xfrm>
+            <a:off x="3935760" y="3130516"/>
+            <a:ext cx="1728192" cy="338554"/>
+          </a:xfrm>
+          <a:prstGeom prst="rect">
+            <a:avLst/>
+          </a:prstGeom>
+          <a:noFill/>
+        </p:spPr>
+        <p:txBody>
+          <a:bodyPr wrap="square">
+            <a:spAutoFit/>
+          </a:bodyPr>
+          <a:lstStyle/>
+          <a:p>
+            <a:r>
+              <a:rPr lang="fr-FR" dirty="0">
+                <a:solidFill>
+                  <a:srgbClr val="333333"/>
+                </a:solidFill>
+                <a:latin typeface="Calibri" panose="020F0502020204030204" pitchFamily="34" charset="0"/>
+              </a:rPr>
+              <a:t>2 / 11         18 %</a:t>
+            </a:r>
+            <a:endParaRPr lang="fr-FR" dirty="0"/>
+          </a:p>
+        </p:txBody>
+      </p:sp>
+      <p:sp>
+        <p:nvSpPr>
+          <p:cNvPr id="16" name="ZoneTexte 15">
+            <a:extLst>
+              <a:ext uri="{FF2B5EF4-FFF2-40B4-BE49-F238E27FC236}">
+                <a16:creationId xmlns:a16="http://schemas.microsoft.com/office/drawing/2014/main" id="{D285AA45-802F-0804-5E37-CC75AFA64442}"/>
+              </a:ext>
+            </a:extLst>
+          </p:cNvPr>
+          <p:cNvSpPr txBox="1"/>
+          <p:nvPr/>
+        </p:nvSpPr>
+        <p:spPr>
+          <a:xfrm>
+            <a:off x="3935760" y="3489963"/>
+            <a:ext cx="1728192" cy="338554"/>
+          </a:xfrm>
+          <a:prstGeom prst="rect">
+            <a:avLst/>
+          </a:prstGeom>
+          <a:noFill/>
+        </p:spPr>
+        <p:txBody>
+          <a:bodyPr wrap="square">
+            <a:spAutoFit/>
+          </a:bodyPr>
+          <a:lstStyle/>
+          <a:p>
+            <a:r>
+              <a:rPr lang="fr-FR" dirty="0">
+                <a:solidFill>
+                  <a:srgbClr val="333333"/>
+                </a:solidFill>
+                <a:latin typeface="Calibri" panose="020F0502020204030204" pitchFamily="34" charset="0"/>
+              </a:rPr>
+              <a:t>4 / 11 	36 %</a:t>
+            </a:r>
+            <a:endParaRPr lang="fr-FR" dirty="0"/>
+          </a:p>
+        </p:txBody>
+      </p:sp>
+      <p:sp>
+        <p:nvSpPr>
+          <p:cNvPr id="17" name="ZoneTexte 16">
+            <a:extLst>
+              <a:ext uri="{FF2B5EF4-FFF2-40B4-BE49-F238E27FC236}">
+                <a16:creationId xmlns:a16="http://schemas.microsoft.com/office/drawing/2014/main" id="{D60DFADF-C1D0-7CC1-A422-4D0AB6464E15}"/>
+              </a:ext>
+            </a:extLst>
+          </p:cNvPr>
+          <p:cNvSpPr txBox="1"/>
+          <p:nvPr/>
+        </p:nvSpPr>
+        <p:spPr>
+          <a:xfrm>
+            <a:off x="3935760" y="3868509"/>
+            <a:ext cx="1728192" cy="338554"/>
+          </a:xfrm>
+          <a:prstGeom prst="rect">
+            <a:avLst/>
+          </a:prstGeom>
+          <a:noFill/>
+        </p:spPr>
+        <p:txBody>
+          <a:bodyPr wrap="square">
+            <a:spAutoFit/>
+          </a:bodyPr>
+          <a:lstStyle/>
+          <a:p>
+            <a:r>
+              <a:rPr lang="fr-FR" dirty="0">
+                <a:solidFill>
+                  <a:srgbClr val="333333"/>
+                </a:solidFill>
+                <a:latin typeface="Calibri" panose="020F0502020204030204" pitchFamily="34" charset="0"/>
+              </a:rPr>
+              <a:t>1 / 11	9%</a:t>
+            </a:r>
+            <a:endParaRPr lang="fr-FR" dirty="0"/>
+          </a:p>
+        </p:txBody>
+      </p:sp>
+      <p:sp>
+        <p:nvSpPr>
+          <p:cNvPr id="18" name="Rectangle : coins arrondis 17">
+            <a:extLst>
+              <a:ext uri="{FF2B5EF4-FFF2-40B4-BE49-F238E27FC236}">
+                <a16:creationId xmlns:a16="http://schemas.microsoft.com/office/drawing/2014/main" id="{1DE9C475-8533-0ED6-EA2A-6E6A9B34260F}"/>
+              </a:ext>
+            </a:extLst>
+          </p:cNvPr>
+          <p:cNvSpPr/>
+          <p:nvPr/>
+        </p:nvSpPr>
+        <p:spPr bwMode="auto">
+          <a:xfrm>
+            <a:off x="6114323" y="2204864"/>
+            <a:ext cx="1683040" cy="307777"/>
+          </a:xfrm>
+          <a:prstGeom prst="roundRect">
+            <a:avLst/>
+          </a:prstGeom>
+          <a:solidFill>
+            <a:srgbClr val="FF960A"/>
+          </a:solidFill>
+          <a:ln w="9525" cap="flat" cmpd="sng" algn="ctr">
+            <a:noFill/>
+            <a:prstDash val="solid"/>
+            <a:round/>
+            <a:headEnd type="none" w="med" len="med"/>
+            <a:tailEnd type="none" w="med" len="med"/>
+          </a:ln>
+          <a:effectLst/>
+        </p:spPr>
+        <p:txBody>
+          <a:bodyPr vert="horz" wrap="square" lIns="91440" tIns="45720" rIns="91440" bIns="45720" numCol="1" rtlCol="0" anchor="ctr" anchorCtr="0" compatLnSpc="1">
+            <a:prstTxWarp prst="textNoShape">
+              <a:avLst/>
+            </a:prstTxWarp>
+          </a:bodyPr>
+          <a:lstStyle/>
+          <a:p>
+            <a:pPr marL="0" marR="0" indent="0" algn="ctr" defTabSz="914400" rtl="0" eaLnBrk="0" fontAlgn="base" latinLnBrk="0" hangingPunct="0">
+              <a:lnSpc>
+                <a:spcPct val="100000"/>
+              </a:lnSpc>
+              <a:spcBef>
+                <a:spcPct val="0"/>
+              </a:spcBef>
+              <a:spcAft>
+                <a:spcPct val="0"/>
+              </a:spcAft>
+              <a:buClrTx/>
+              <a:buSzTx/>
+              <a:buFontTx/>
+              <a:buNone/>
+              <a:tabLst/>
+            </a:pPr>
+            <a:r>
+              <a:rPr kumimoji="0" lang="fr-FR" sz="1800" b="0" i="0" u="none" strike="noStrike" cap="none" normalizeH="0" baseline="0" dirty="0">
+                <a:ln>
+                  <a:noFill/>
+                </a:ln>
+                <a:solidFill>
+                  <a:srgbClr val="FFFFFF"/>
+                </a:solidFill>
+                <a:effectLst/>
+                <a:latin typeface="Calibri" panose="020F0502020204030204" pitchFamily="34" charset="0"/>
+                <a:ea typeface="MS PGothic" pitchFamily="34" charset="-128"/>
+              </a:rPr>
+              <a:t>FISE</a:t>
+            </a:r>
+            <a:endParaRPr kumimoji="0" lang="fr-FR" sz="1800" b="0" i="0" u="none" strike="noStrike" cap="none" normalizeH="0" baseline="0" dirty="0">
+              <a:ln>
+                <a:noFill/>
+              </a:ln>
+              <a:solidFill>
+                <a:srgbClr val="FFFFFF"/>
+              </a:solidFill>
+              <a:effectLst/>
+              <a:latin typeface="Arial" charset="0"/>
+              <a:ea typeface="MS PGothic" pitchFamily="34" charset="-128"/>
+            </a:endParaRPr>
+          </a:p>
+        </p:txBody>
+      </p:sp>
+      <p:sp>
+        <p:nvSpPr>
+          <p:cNvPr id="19" name="ZoneTexte 18">
+            <a:extLst>
+              <a:ext uri="{FF2B5EF4-FFF2-40B4-BE49-F238E27FC236}">
+                <a16:creationId xmlns:a16="http://schemas.microsoft.com/office/drawing/2014/main" id="{0877A7E1-38B4-E6DC-B21A-7AAA6B9C95A4}"/>
+              </a:ext>
+            </a:extLst>
+          </p:cNvPr>
+          <p:cNvSpPr txBox="1"/>
+          <p:nvPr/>
+        </p:nvSpPr>
+        <p:spPr>
+          <a:xfrm>
+            <a:off x="6101138" y="2637819"/>
+            <a:ext cx="1728192" cy="338554"/>
+          </a:xfrm>
+          <a:prstGeom prst="rect">
+            <a:avLst/>
+          </a:prstGeom>
+          <a:noFill/>
+        </p:spPr>
+        <p:txBody>
+          <a:bodyPr wrap="square">
+            <a:spAutoFit/>
+          </a:bodyPr>
+          <a:lstStyle/>
+          <a:p>
+            <a:r>
+              <a:rPr lang="fr-FR" dirty="0">
+                <a:solidFill>
+                  <a:srgbClr val="333333"/>
+                </a:solidFill>
+                <a:latin typeface="Calibri" panose="020F0502020204030204" pitchFamily="34" charset="0"/>
+              </a:rPr>
+              <a:t>27 / 73         37 %</a:t>
+            </a:r>
+            <a:endParaRPr lang="fr-FR" dirty="0"/>
+          </a:p>
+        </p:txBody>
+      </p:sp>
+      <p:sp>
+        <p:nvSpPr>
+          <p:cNvPr id="20" name="ZoneTexte 19">
+            <a:extLst>
+              <a:ext uri="{FF2B5EF4-FFF2-40B4-BE49-F238E27FC236}">
+                <a16:creationId xmlns:a16="http://schemas.microsoft.com/office/drawing/2014/main" id="{DE3F092C-5DB9-1F0B-1597-F6805A201070}"/>
+              </a:ext>
+            </a:extLst>
+          </p:cNvPr>
+          <p:cNvSpPr txBox="1"/>
+          <p:nvPr/>
+        </p:nvSpPr>
+        <p:spPr>
+          <a:xfrm>
+            <a:off x="6096000" y="3109623"/>
+            <a:ext cx="1728192" cy="338554"/>
+          </a:xfrm>
+          <a:prstGeom prst="rect">
+            <a:avLst/>
+          </a:prstGeom>
+          <a:noFill/>
+        </p:spPr>
+        <p:txBody>
+          <a:bodyPr wrap="square">
+            <a:spAutoFit/>
+          </a:bodyPr>
+          <a:lstStyle/>
+          <a:p>
+            <a:r>
+              <a:rPr lang="fr-FR" dirty="0">
+                <a:solidFill>
+                  <a:srgbClr val="333333"/>
+                </a:solidFill>
+                <a:latin typeface="Calibri" panose="020F0502020204030204" pitchFamily="34" charset="0"/>
+              </a:rPr>
+              <a:t>10 / 73         14 %</a:t>
+            </a:r>
+            <a:endParaRPr lang="fr-FR" dirty="0"/>
+          </a:p>
+        </p:txBody>
+      </p:sp>
+      <p:sp>
+        <p:nvSpPr>
+          <p:cNvPr id="21" name="ZoneTexte 20">
+            <a:extLst>
+              <a:ext uri="{FF2B5EF4-FFF2-40B4-BE49-F238E27FC236}">
+                <a16:creationId xmlns:a16="http://schemas.microsoft.com/office/drawing/2014/main" id="{9CBB299B-6596-6D44-5FBF-5532E0C99F37}"/>
+              </a:ext>
+            </a:extLst>
+          </p:cNvPr>
+          <p:cNvSpPr txBox="1"/>
+          <p:nvPr/>
+        </p:nvSpPr>
+        <p:spPr>
+          <a:xfrm>
+            <a:off x="6114323" y="3494831"/>
+            <a:ext cx="1728192" cy="338554"/>
+          </a:xfrm>
+          <a:prstGeom prst="rect">
+            <a:avLst/>
+          </a:prstGeom>
+          <a:noFill/>
+        </p:spPr>
+        <p:txBody>
+          <a:bodyPr wrap="square">
+            <a:spAutoFit/>
+          </a:bodyPr>
+          <a:lstStyle/>
+          <a:p>
+            <a:r>
+              <a:rPr lang="fr-FR" dirty="0">
+                <a:solidFill>
+                  <a:srgbClr val="333333"/>
+                </a:solidFill>
+                <a:latin typeface="Calibri" panose="020F0502020204030204" pitchFamily="34" charset="0"/>
+              </a:rPr>
+              <a:t>26 / 73         36 %</a:t>
+            </a:r>
+            <a:endParaRPr lang="fr-FR" dirty="0"/>
+          </a:p>
+        </p:txBody>
+      </p:sp>
+      <p:sp>
+        <p:nvSpPr>
+          <p:cNvPr id="22" name="ZoneTexte 21">
+            <a:extLst>
+              <a:ext uri="{FF2B5EF4-FFF2-40B4-BE49-F238E27FC236}">
+                <a16:creationId xmlns:a16="http://schemas.microsoft.com/office/drawing/2014/main" id="{230CEF54-18EB-A43B-0BB3-6E470E7C33E5}"/>
+              </a:ext>
+            </a:extLst>
+          </p:cNvPr>
+          <p:cNvSpPr txBox="1"/>
+          <p:nvPr/>
+        </p:nvSpPr>
+        <p:spPr>
+          <a:xfrm>
+            <a:off x="6102099" y="3880947"/>
+            <a:ext cx="1728192" cy="338554"/>
+          </a:xfrm>
+          <a:prstGeom prst="rect">
+            <a:avLst/>
+          </a:prstGeom>
+          <a:noFill/>
+        </p:spPr>
+        <p:txBody>
+          <a:bodyPr wrap="square">
+            <a:spAutoFit/>
+          </a:bodyPr>
+          <a:lstStyle/>
+          <a:p>
+            <a:r>
+              <a:rPr lang="fr-FR" dirty="0">
+                <a:solidFill>
+                  <a:srgbClr val="333333"/>
+                </a:solidFill>
+                <a:latin typeface="Calibri" panose="020F0502020204030204" pitchFamily="34" charset="0"/>
+              </a:rPr>
+              <a:t>9 / 73         	  12 %</a:t>
+            </a:r>
+            <a:endParaRPr lang="fr-FR" dirty="0"/>
+          </a:p>
+        </p:txBody>
+      </p:sp>
+      <p:sp>
+        <p:nvSpPr>
+          <p:cNvPr id="23" name="Flèche : chevron 22">
+            <a:extLst>
+              <a:ext uri="{FF2B5EF4-FFF2-40B4-BE49-F238E27FC236}">
+                <a16:creationId xmlns:a16="http://schemas.microsoft.com/office/drawing/2014/main" id="{C4C1AA5B-08FD-B444-C062-C87F610DE724}"/>
+              </a:ext>
+            </a:extLst>
+          </p:cNvPr>
+          <p:cNvSpPr/>
+          <p:nvPr/>
+        </p:nvSpPr>
+        <p:spPr bwMode="auto">
+          <a:xfrm>
+            <a:off x="767406" y="4797152"/>
+            <a:ext cx="3312369" cy="307777"/>
+          </a:xfrm>
+          <a:prstGeom prst="chevron">
+            <a:avLst/>
+          </a:prstGeom>
+          <a:solidFill>
+            <a:srgbClr val="00305E"/>
+          </a:solidFill>
+          <a:ln w="9525" cap="flat" cmpd="sng" algn="ctr">
+            <a:noFill/>
+            <a:prstDash val="solid"/>
+            <a:round/>
+            <a:headEnd type="none" w="med" len="med"/>
+            <a:tailEnd type="none" w="med" len="med"/>
+          </a:ln>
+          <a:effectLst/>
+          <a:extLst>
+            <a:ext uri="{AF507438-7753-43e0-B8FC-AC1667EBCBE1}">
+              <a14:hiddenEffects xmlns="" xmlns:a14="http://schemas.microsoft.com/office/drawing/2010/main">
+                <a:effectLst>
+                  <a:outerShdw dist="35921" dir="2700000" algn="ctr" rotWithShape="0">
+                    <a:schemeClr val="bg2"/>
+                  </a:outerShdw>
+                </a:effectLst>
+              </a14:hiddenEffects>
+            </a:ext>
+          </a:extLst>
+        </p:spPr>
+        <p:txBody>
+          <a:bodyPr vert="horz" wrap="square" lIns="91440" tIns="45720" rIns="91440" bIns="45720" numCol="1" rtlCol="0" anchor="t" anchorCtr="0" compatLnSpc="1">
+            <a:prstTxWarp prst="textNoShape">
+              <a:avLst/>
+            </a:prstTxWarp>
+          </a:bodyPr>
+          <a:lstStyle/>
+          <a:p>
+            <a:pPr marL="0" marR="0" indent="0" algn="ctr" defTabSz="914400" rtl="0" eaLnBrk="0" fontAlgn="base" latinLnBrk="0" hangingPunct="0">
+              <a:lnSpc>
+                <a:spcPct val="100000"/>
+              </a:lnSpc>
+              <a:spcBef>
+                <a:spcPct val="0"/>
+              </a:spcBef>
+              <a:spcAft>
+                <a:spcPct val="0"/>
+              </a:spcAft>
+              <a:buClrTx/>
+              <a:buSzTx/>
+              <a:buFontTx/>
+              <a:buNone/>
+              <a:tabLst/>
+            </a:pPr>
+            <a:r>
+              <a:rPr kumimoji="0" lang="fr-FR" b="1" i="0" u="none" strike="noStrike" cap="none" normalizeH="0" baseline="0" dirty="0">
+                <a:ln>
+                  <a:noFill/>
+                </a:ln>
+                <a:solidFill>
+                  <a:schemeClr val="bg1"/>
+                </a:solidFill>
+                <a:effectLst/>
+                <a:latin typeface="Arial" charset="0"/>
+                <a:ea typeface="ＭＳ Ｐゴシック" pitchFamily="1" charset="-128"/>
+              </a:rPr>
+              <a:t>Thèses</a:t>
+            </a:r>
+          </a:p>
+        </p:txBody>
+      </p:sp>
+      <p:sp>
+        <p:nvSpPr>
+          <p:cNvPr id="24" name="ZoneTexte 23">
+            <a:extLst>
+              <a:ext uri="{FF2B5EF4-FFF2-40B4-BE49-F238E27FC236}">
+                <a16:creationId xmlns:a16="http://schemas.microsoft.com/office/drawing/2014/main" id="{45394560-3665-1B94-E47C-65C98D57F842}"/>
+              </a:ext>
+            </a:extLst>
+          </p:cNvPr>
+          <p:cNvSpPr txBox="1"/>
+          <p:nvPr/>
+        </p:nvSpPr>
+        <p:spPr>
+          <a:xfrm>
+            <a:off x="4566151" y="1686406"/>
+            <a:ext cx="3096344" cy="307777"/>
+          </a:xfrm>
+          <a:prstGeom prst="rect">
+            <a:avLst/>
+          </a:prstGeom>
+          <a:noFill/>
+        </p:spPr>
+        <p:txBody>
+          <a:bodyPr wrap="square">
+            <a:spAutoFit/>
+          </a:bodyPr>
+          <a:lstStyle/>
+          <a:p>
+            <a:r>
+              <a:rPr lang="fr-FR" sz="1400" dirty="0">
+                <a:solidFill>
+                  <a:srgbClr val="333333"/>
+                </a:solidFill>
+                <a:latin typeface="Calibri" panose="020F0502020204030204" pitchFamily="34" charset="0"/>
+              </a:rPr>
+              <a:t>100% en France (thèses et activité prof.)</a:t>
+            </a:r>
+            <a:endParaRPr lang="fr-FR" sz="1400" dirty="0"/>
+          </a:p>
+        </p:txBody>
+      </p:sp>
+      <p:sp>
+        <p:nvSpPr>
+          <p:cNvPr id="25" name="ZoneTexte 24">
+            <a:extLst>
+              <a:ext uri="{FF2B5EF4-FFF2-40B4-BE49-F238E27FC236}">
+                <a16:creationId xmlns:a16="http://schemas.microsoft.com/office/drawing/2014/main" id="{37DD2768-28F1-E5D6-23B4-60934FC70C50}"/>
+              </a:ext>
+            </a:extLst>
+          </p:cNvPr>
+          <p:cNvSpPr txBox="1"/>
+          <p:nvPr/>
+        </p:nvSpPr>
+        <p:spPr>
+          <a:xfrm>
+            <a:off x="1559494" y="5949280"/>
+            <a:ext cx="8136906" cy="338554"/>
+          </a:xfrm>
+          <a:prstGeom prst="rect">
+            <a:avLst/>
+          </a:prstGeom>
+          <a:noFill/>
+        </p:spPr>
+        <p:txBody>
+          <a:bodyPr wrap="square">
+            <a:spAutoFit/>
+          </a:bodyPr>
+          <a:lstStyle/>
+          <a:p>
+            <a:r>
+              <a:rPr lang="fr-FR" dirty="0">
+                <a:solidFill>
+                  <a:srgbClr val="333333"/>
+                </a:solidFill>
+                <a:latin typeface="Calibri" panose="020F0502020204030204" pitchFamily="34" charset="0"/>
+              </a:rPr>
+              <a:t>3 / 30 	à l’</a:t>
+            </a:r>
+            <a:r>
+              <a:rPr lang="fr-FR" b="1" dirty="0">
+                <a:solidFill>
+                  <a:srgbClr val="333333"/>
+                </a:solidFill>
+                <a:latin typeface="Calibri" panose="020F0502020204030204" pitchFamily="34" charset="0"/>
+              </a:rPr>
+              <a:t>étranger</a:t>
+            </a:r>
+            <a:r>
+              <a:rPr lang="fr-FR" dirty="0">
+                <a:solidFill>
+                  <a:srgbClr val="333333"/>
+                </a:solidFill>
+                <a:latin typeface="Calibri" panose="020F0502020204030204" pitchFamily="34" charset="0"/>
+              </a:rPr>
+              <a:t>   (2x Japon, 1x Danemark)		</a:t>
+            </a:r>
+            <a:r>
+              <a:rPr lang="fr-FR" b="1" dirty="0">
+                <a:solidFill>
+                  <a:schemeClr val="bg1"/>
+                </a:solidFill>
+                <a:highlight>
+                  <a:srgbClr val="222268"/>
+                </a:highlight>
+                <a:latin typeface="Calibri" panose="020F0502020204030204" pitchFamily="34" charset="0"/>
+              </a:rPr>
+              <a:t> 14,7 %     CGE 2025 </a:t>
+            </a:r>
+            <a:r>
+              <a:rPr lang="fr-FR" dirty="0">
+                <a:solidFill>
+                  <a:srgbClr val="333333"/>
+                </a:solidFill>
+                <a:latin typeface="Calibri" panose="020F0502020204030204" pitchFamily="34" charset="0"/>
+              </a:rPr>
+              <a:t>	</a:t>
+            </a:r>
+            <a:endParaRPr lang="fr-FR" dirty="0"/>
+          </a:p>
+        </p:txBody>
+      </p:sp>
+      <p:sp>
+        <p:nvSpPr>
+          <p:cNvPr id="26" name="ZoneTexte 25">
+            <a:extLst>
+              <a:ext uri="{FF2B5EF4-FFF2-40B4-BE49-F238E27FC236}">
+                <a16:creationId xmlns:a16="http://schemas.microsoft.com/office/drawing/2014/main" id="{223D78A2-4F52-C17D-D565-C4A7389ED652}"/>
+              </a:ext>
+            </a:extLst>
+          </p:cNvPr>
+          <p:cNvSpPr txBox="1"/>
+          <p:nvPr/>
+        </p:nvSpPr>
+        <p:spPr>
+          <a:xfrm>
+            <a:off x="1559494" y="6258798"/>
+            <a:ext cx="4752530" cy="338554"/>
+          </a:xfrm>
+          <a:prstGeom prst="rect">
+            <a:avLst/>
+          </a:prstGeom>
+          <a:noFill/>
+        </p:spPr>
+        <p:txBody>
+          <a:bodyPr wrap="square">
+            <a:spAutoFit/>
+          </a:bodyPr>
+          <a:lstStyle/>
+          <a:p>
+            <a:r>
+              <a:rPr lang="fr-FR" dirty="0">
+                <a:solidFill>
+                  <a:srgbClr val="333333"/>
+                </a:solidFill>
+                <a:latin typeface="Calibri" panose="020F0502020204030204" pitchFamily="34" charset="0"/>
+              </a:rPr>
+              <a:t>2 LCF, 1 LHC, 1 LP2N</a:t>
+            </a:r>
+            <a:endParaRPr lang="fr-FR" dirty="0"/>
+          </a:p>
+        </p:txBody>
+      </p:sp>
+      <p:sp>
+        <p:nvSpPr>
+          <p:cNvPr id="27" name="ZoneTexte 26">
+            <a:extLst>
+              <a:ext uri="{FF2B5EF4-FFF2-40B4-BE49-F238E27FC236}">
+                <a16:creationId xmlns:a16="http://schemas.microsoft.com/office/drawing/2014/main" id="{0B430199-A170-B95D-8909-0409B7FE0347}"/>
+              </a:ext>
+            </a:extLst>
+          </p:cNvPr>
+          <p:cNvSpPr txBox="1"/>
+          <p:nvPr/>
+        </p:nvSpPr>
+        <p:spPr>
+          <a:xfrm>
+            <a:off x="1559494" y="5217122"/>
+            <a:ext cx="4752530" cy="338554"/>
+          </a:xfrm>
+          <a:prstGeom prst="rect">
+            <a:avLst/>
+          </a:prstGeom>
+          <a:noFill/>
+        </p:spPr>
+        <p:txBody>
+          <a:bodyPr wrap="square">
+            <a:spAutoFit/>
+          </a:bodyPr>
+          <a:lstStyle/>
+          <a:p>
+            <a:r>
+              <a:rPr lang="fr-FR" dirty="0">
+                <a:solidFill>
+                  <a:srgbClr val="333333"/>
+                </a:solidFill>
+                <a:latin typeface="Calibri" panose="020F0502020204030204" pitchFamily="34" charset="0"/>
+              </a:rPr>
+              <a:t>30 / 84 	</a:t>
+            </a:r>
+            <a:r>
+              <a:rPr lang="fr-FR" b="1" dirty="0">
+                <a:solidFill>
+                  <a:srgbClr val="333333"/>
+                </a:solidFill>
+                <a:latin typeface="Calibri" panose="020F0502020204030204" pitchFamily="34" charset="0"/>
+              </a:rPr>
+              <a:t>36 %              	 </a:t>
+            </a:r>
+            <a:r>
+              <a:rPr lang="fr-FR" b="1" dirty="0">
+                <a:solidFill>
+                  <a:schemeClr val="bg1"/>
+                </a:solidFill>
+                <a:highlight>
+                  <a:srgbClr val="222268"/>
+                </a:highlight>
+                <a:latin typeface="Calibri" panose="020F0502020204030204" pitchFamily="34" charset="0"/>
+              </a:rPr>
+              <a:t> 5,6 %     CGE 2025</a:t>
+            </a:r>
+            <a:endParaRPr lang="fr-FR" b="1" dirty="0">
+              <a:solidFill>
+                <a:schemeClr val="bg1"/>
+              </a:solidFill>
+              <a:highlight>
+                <a:srgbClr val="222268"/>
+              </a:highlight>
+            </a:endParaRPr>
+          </a:p>
+        </p:txBody>
+      </p:sp>
+    </p:spTree>
+    <p:extLst>
+      <p:ext uri="{BB962C8B-B14F-4D97-AF65-F5344CB8AC3E}">
+        <p14:creationId xmlns:p14="http://schemas.microsoft.com/office/powerpoint/2010/main" val="880639409"/>
+      </p:ext>
+    </p:extLst>
+  </p:cSld>
+  <p:clrMapOvr>
+    <a:masterClrMapping/>
+  </p:clrMapOvr>
+</p:sld>
+</file>
+
+<file path=ppt/slides/slide11.xml><?xml version="1.0" encoding="utf-8"?>
+<p:sld xmlns:a="http://schemas.openxmlformats.org/drawingml/2006/main" xmlns:r="http://schemas.openxmlformats.org/officeDocument/2006/relationships" xmlns:p="http://schemas.openxmlformats.org/presentationml/2006/main">
+  <p:cSld>
+    <p:spTree>
+      <p:nvGrpSpPr>
+        <p:cNvPr id="1" name="">
+          <a:extLst>
+            <a:ext uri="{FF2B5EF4-FFF2-40B4-BE49-F238E27FC236}">
+              <a16:creationId xmlns:a16="http://schemas.microsoft.com/office/drawing/2014/main" id="{B99C7A6B-25F1-8A81-A738-5B913CD7B6C3}"/>
+            </a:ext>
+          </a:extLst>
+        </p:cNvPr>
+        <p:cNvGrpSpPr/>
+        <p:nvPr/>
+      </p:nvGrpSpPr>
+      <p:grpSpPr>
+        <a:xfrm>
+          <a:off x="0" y="0"/>
+          <a:ext cx="0" cy="0"/>
+          <a:chOff x="0" y="0"/>
+          <a:chExt cx="0" cy="0"/>
+        </a:xfrm>
+      </p:grpSpPr>
+      <p:sp>
+        <p:nvSpPr>
+          <p:cNvPr id="2" name="Titre 1">
+            <a:extLst>
+              <a:ext uri="{FF2B5EF4-FFF2-40B4-BE49-F238E27FC236}">
+                <a16:creationId xmlns:a16="http://schemas.microsoft.com/office/drawing/2014/main" id="{4EA00DEE-C22F-33FE-F07B-4EE96DE2C194}"/>
+              </a:ext>
+            </a:extLst>
+          </p:cNvPr>
+          <p:cNvSpPr>
+            <a:spLocks noGrp="1"/>
+          </p:cNvSpPr>
+          <p:nvPr>
+            <p:ph type="title"/>
+          </p:nvPr>
+        </p:nvSpPr>
+        <p:spPr/>
+        <p:txBody>
+          <a:bodyPr/>
+          <a:lstStyle/>
+          <a:p>
+            <a:r>
+              <a:rPr lang="fr-FR" dirty="0"/>
+              <a:t>Enquête CGE / Chiffres clefs</a:t>
+            </a:r>
+          </a:p>
+        </p:txBody>
+      </p:sp>
+      <p:sp>
+        <p:nvSpPr>
+          <p:cNvPr id="7" name="Flèche : chevron 6">
+            <a:extLst>
+              <a:ext uri="{FF2B5EF4-FFF2-40B4-BE49-F238E27FC236}">
+                <a16:creationId xmlns:a16="http://schemas.microsoft.com/office/drawing/2014/main" id="{780EF0C3-7563-428D-D529-FF58B0110316}"/>
+              </a:ext>
+            </a:extLst>
+          </p:cNvPr>
+          <p:cNvSpPr/>
+          <p:nvPr/>
+        </p:nvSpPr>
+        <p:spPr bwMode="auto">
+          <a:xfrm>
+            <a:off x="767407" y="1720181"/>
+            <a:ext cx="3312369" cy="307777"/>
+          </a:xfrm>
+          <a:prstGeom prst="chevron">
+            <a:avLst/>
+          </a:prstGeom>
+          <a:solidFill>
+            <a:srgbClr val="00305E"/>
+          </a:solidFill>
+          <a:ln w="9525" cap="flat" cmpd="sng" algn="ctr">
+            <a:noFill/>
+            <a:prstDash val="solid"/>
+            <a:round/>
+            <a:headEnd type="none" w="med" len="med"/>
+            <a:tailEnd type="none" w="med" len="med"/>
+          </a:ln>
+          <a:effectLst/>
+          <a:extLst>
+            <a:ext uri="{AF507438-7753-43e0-B8FC-AC1667EBCBE1}">
+              <a14:hiddenEffects xmlns="" xmlns:a14="http://schemas.microsoft.com/office/drawing/2010/main">
+                <a:effectLst>
+                  <a:outerShdw dist="35921" dir="2700000" algn="ctr" rotWithShape="0">
+                    <a:schemeClr val="bg2"/>
+                  </a:outerShdw>
+                </a:effectLst>
+              </a14:hiddenEffects>
+            </a:ext>
+          </a:extLst>
+        </p:spPr>
+        <p:txBody>
+          <a:bodyPr vert="horz" wrap="square" lIns="91440" tIns="45720" rIns="91440" bIns="45720" numCol="1" rtlCol="0" anchor="t" anchorCtr="0" compatLnSpc="1">
+            <a:prstTxWarp prst="textNoShape">
+              <a:avLst/>
+            </a:prstTxWarp>
+          </a:bodyPr>
+          <a:lstStyle/>
+          <a:p>
+            <a:pPr marL="0" marR="0" indent="0" algn="ctr" defTabSz="914400" rtl="0" eaLnBrk="0" fontAlgn="base" latinLnBrk="0" hangingPunct="0">
+              <a:lnSpc>
+                <a:spcPct val="100000"/>
+              </a:lnSpc>
+              <a:spcBef>
+                <a:spcPct val="0"/>
+              </a:spcBef>
+              <a:spcAft>
+                <a:spcPct val="0"/>
+              </a:spcAft>
+              <a:buClrTx/>
+              <a:buSzTx/>
+              <a:buFontTx/>
+              <a:buNone/>
+              <a:tabLst/>
+            </a:pPr>
+            <a:r>
+              <a:rPr kumimoji="0" lang="fr-FR" b="1" i="0" u="none" strike="noStrike" cap="none" normalizeH="0" baseline="0" dirty="0">
+                <a:ln>
+                  <a:noFill/>
+                </a:ln>
+                <a:solidFill>
+                  <a:schemeClr val="bg1"/>
+                </a:solidFill>
+                <a:effectLst/>
+                <a:latin typeface="Arial" charset="0"/>
+                <a:ea typeface="ＭＳ Ｐゴシック" pitchFamily="1" charset="-128"/>
+              </a:rPr>
+              <a:t>RSE</a:t>
+            </a:r>
+          </a:p>
+        </p:txBody>
+      </p:sp>
+      <p:sp>
+        <p:nvSpPr>
+          <p:cNvPr id="17" name="Rectangle : coins arrondis 16">
+            <a:extLst>
+              <a:ext uri="{FF2B5EF4-FFF2-40B4-BE49-F238E27FC236}">
+                <a16:creationId xmlns:a16="http://schemas.microsoft.com/office/drawing/2014/main" id="{2BFBCB5B-C8BA-8032-F9B5-B47991EFD838}"/>
+              </a:ext>
+            </a:extLst>
+          </p:cNvPr>
+          <p:cNvSpPr/>
+          <p:nvPr/>
+        </p:nvSpPr>
+        <p:spPr bwMode="auto">
+          <a:xfrm>
+            <a:off x="9048328" y="1585795"/>
+            <a:ext cx="2214377" cy="461665"/>
+          </a:xfrm>
+          <a:prstGeom prst="roundRect">
+            <a:avLst/>
+          </a:prstGeom>
+          <a:solidFill>
+            <a:srgbClr val="FF960A"/>
+          </a:solidFill>
+          <a:ln w="9525" cap="flat" cmpd="sng" algn="ctr">
+            <a:noFill/>
+            <a:prstDash val="solid"/>
+            <a:round/>
+            <a:headEnd type="none" w="med" len="med"/>
+            <a:tailEnd type="none" w="med" len="med"/>
+          </a:ln>
+          <a:effectLst/>
+        </p:spPr>
+        <p:txBody>
+          <a:bodyPr vert="horz" wrap="square" lIns="91440" tIns="45720" rIns="91440" bIns="45720" numCol="1" rtlCol="0" anchor="ctr" anchorCtr="0" compatLnSpc="1">
+            <a:prstTxWarp prst="textNoShape">
+              <a:avLst/>
+            </a:prstTxWarp>
+          </a:bodyPr>
+          <a:lstStyle/>
+          <a:p>
+            <a:pPr marL="0" marR="0" indent="0" algn="ctr" defTabSz="914400" rtl="0" eaLnBrk="0" fontAlgn="base" latinLnBrk="0" hangingPunct="0">
+              <a:lnSpc>
+                <a:spcPct val="100000"/>
+              </a:lnSpc>
+              <a:spcBef>
+                <a:spcPct val="0"/>
+              </a:spcBef>
+              <a:spcAft>
+                <a:spcPct val="0"/>
+              </a:spcAft>
+              <a:buClrTx/>
+              <a:buSzTx/>
+              <a:buFontTx/>
+              <a:buNone/>
+              <a:tabLst/>
+            </a:pPr>
+            <a:r>
+              <a:rPr kumimoji="0" lang="fr-FR" sz="1800" b="0" i="0" u="none" strike="noStrike" cap="none" normalizeH="0" baseline="0" dirty="0">
+                <a:ln>
+                  <a:noFill/>
+                </a:ln>
+                <a:solidFill>
+                  <a:srgbClr val="FFFFFF"/>
+                </a:solidFill>
+                <a:effectLst/>
+                <a:latin typeface="Calibri" panose="020F0502020204030204" pitchFamily="34" charset="0"/>
+                <a:ea typeface="MS PGothic" pitchFamily="34" charset="-128"/>
+              </a:rPr>
               <a:t>Rapport CGE 2025</a:t>
             </a:r>
             <a:endParaRPr kumimoji="0" lang="fr-FR" sz="1800" b="0" i="0" u="none" strike="noStrike" cap="none" normalizeH="0" baseline="0" dirty="0">
@@ -6614,7 +7810,7 @@
 </p:sld>
 </file>
 
-<file path=ppt/slides/slide11.xml><?xml version="1.0" encoding="utf-8"?>
+<file path=ppt/slides/slide12.xml><?xml version="1.0" encoding="utf-8"?>
 <p:sld xmlns:a="http://schemas.openxmlformats.org/drawingml/2006/main" xmlns:r="http://schemas.openxmlformats.org/officeDocument/2006/relationships" xmlns:p="http://schemas.openxmlformats.org/presentationml/2006/main">
   <p:cSld>
     <p:spTree>
@@ -6698,7 +7894,7 @@
           <a:effectLst/>
           <a:extLst>
             <a:ext uri="{AF507438-7753-43e0-B8FC-AC1667EBCBE1}">
-              <a14:hiddenEffects xmlns="" xmlns:a14="http://schemas.microsoft.com/office/drawing/2010/main">
+              <a14:hiddenEffects xmlns:a14="http://schemas.microsoft.com/office/drawing/2010/main" xmlns="">
                 <a:effectLst>
                   <a:outerShdw dist="35921" dir="2700000" algn="ctr" rotWithShape="0">
                     <a:schemeClr val="bg2"/>
@@ -7000,7 +8196,7 @@
           </a:effectLst>
           <a:extLst>
             <a:ext uri="{AF507438-7753-43e0-B8FC-AC1667EBCBE1}">
-              <a14:hiddenEffects xmlns:a14="http://schemas.microsoft.com/office/drawing/2010/main" xmlns="">
+              <a14:hiddenEffects xmlns="" xmlns:a14="http://schemas.microsoft.com/office/drawing/2010/main">
                 <a:effectLst>
                   <a:outerShdw dist="35921" dir="2700000" algn="ctr" rotWithShape="0">
                     <a:schemeClr val="bg2"/>
@@ -7093,7 +8289,7 @@
           </a:effectLst>
           <a:extLst>
             <a:ext uri="{AF507438-7753-43e0-B8FC-AC1667EBCBE1}">
-              <a14:hiddenEffects xmlns:a14="http://schemas.microsoft.com/office/drawing/2010/main" xmlns="">
+              <a14:hiddenEffects xmlns="" xmlns:a14="http://schemas.microsoft.com/office/drawing/2010/main">
                 <a:effectLst>
                   <a:outerShdw dist="35921" dir="2700000" algn="ctr" rotWithShape="0">
                     <a:schemeClr val="bg2"/>
@@ -7184,7 +8380,7 @@
           </a:effectLst>
           <a:extLst>
             <a:ext uri="{AF507438-7753-43e0-B8FC-AC1667EBCBE1}">
-              <a14:hiddenEffects xmlns:a14="http://schemas.microsoft.com/office/drawing/2010/main" xmlns="">
+              <a14:hiddenEffects xmlns="" xmlns:a14="http://schemas.microsoft.com/office/drawing/2010/main">
                 <a:effectLst>
                   <a:outerShdw dist="35921" dir="2700000" algn="ctr" rotWithShape="0">
                     <a:schemeClr val="bg2"/>
@@ -7277,7 +8473,7 @@
           </a:effectLst>
           <a:extLst>
             <a:ext uri="{AF507438-7753-43e0-B8FC-AC1667EBCBE1}">
-              <a14:hiddenEffects xmlns:a14="http://schemas.microsoft.com/office/drawing/2010/main" xmlns="">
+              <a14:hiddenEffects xmlns="" xmlns:a14="http://schemas.microsoft.com/office/drawing/2010/main">
                 <a:effectLst>
                   <a:outerShdw dist="35921" dir="2700000" algn="ctr" rotWithShape="0">
                     <a:schemeClr val="bg2"/>
@@ -7360,7 +8556,7 @@
           <a:effectLst/>
           <a:extLst>
             <a:ext uri="{AF507438-7753-43e0-B8FC-AC1667EBCBE1}">
-              <a14:hiddenEffects xmlns:a14="http://schemas.microsoft.com/office/drawing/2010/main" xmlns="">
+              <a14:hiddenEffects xmlns="" xmlns:a14="http://schemas.microsoft.com/office/drawing/2010/main">
                 <a:effectLst>
                   <a:outerShdw dist="35921" dir="2700000" algn="ctr" rotWithShape="0">
                     <a:schemeClr val="bg2"/>
@@ -7441,7 +8637,7 @@
           <a:effectLst/>
           <a:extLst>
             <a:ext uri="{AF507438-7753-43e0-B8FC-AC1667EBCBE1}">
-              <a14:hiddenEffects xmlns="" xmlns:a14="http://schemas.microsoft.com/office/drawing/2010/main">
+              <a14:hiddenEffects xmlns:a14="http://schemas.microsoft.com/office/drawing/2010/main" xmlns="">
                 <a:effectLst>
                   <a:outerShdw dist="35921" dir="2700000" algn="ctr" rotWithShape="0">
                     <a:schemeClr val="bg2"/>
@@ -7525,7 +8721,7 @@
           <a:effectLst/>
           <a:extLst>
             <a:ext uri="{AF507438-7753-43e0-B8FC-AC1667EBCBE1}">
-              <a14:hiddenEffects xmlns="" xmlns:a14="http://schemas.microsoft.com/office/drawing/2010/main">
+              <a14:hiddenEffects xmlns:a14="http://schemas.microsoft.com/office/drawing/2010/main" xmlns="">
                 <a:effectLst>
                   <a:outerShdw dist="35921" dir="2700000" algn="ctr" rotWithShape="0">
                     <a:schemeClr val="bg2"/>
@@ -7609,7 +8805,7 @@
           <a:effectLst/>
           <a:extLst>
             <a:ext uri="{AF507438-7753-43e0-B8FC-AC1667EBCBE1}">
-              <a14:hiddenEffects xmlns="" xmlns:a14="http://schemas.microsoft.com/office/drawing/2010/main">
+              <a14:hiddenEffects xmlns:a14="http://schemas.microsoft.com/office/drawing/2010/main" xmlns="">
                 <a:effectLst>
                   <a:outerShdw dist="35921" dir="2700000" algn="ctr" rotWithShape="0">
                     <a:schemeClr val="bg2"/>
@@ -7693,7 +8889,7 @@
           <a:effectLst/>
           <a:extLst>
             <a:ext uri="{AF507438-7753-43e0-B8FC-AC1667EBCBE1}">
-              <a14:hiddenEffects xmlns="" xmlns:a14="http://schemas.microsoft.com/office/drawing/2010/main">
+              <a14:hiddenEffects xmlns:a14="http://schemas.microsoft.com/office/drawing/2010/main" xmlns="">
                 <a:effectLst>
                   <a:outerShdw dist="35921" dir="2700000" algn="ctr" rotWithShape="0">
                     <a:schemeClr val="bg2"/>
@@ -8457,7 +9653,7 @@
           <a:effectLst/>
           <a:extLst>
             <a:ext uri="{AF507438-7753-43e0-B8FC-AC1667EBCBE1}">
-              <a14:hiddenEffects xmlns:a14="http://schemas.microsoft.com/office/drawing/2010/main" xmlns="">
+              <a14:hiddenEffects xmlns="" xmlns:a14="http://schemas.microsoft.com/office/drawing/2010/main">
                 <a:effectLst>
                   <a:outerShdw dist="35921" dir="2700000" algn="ctr" rotWithShape="0">
                     <a:schemeClr val="bg2"/>
@@ -8505,7 +9701,7 @@
           <a:effectLst/>
           <a:extLst>
             <a:ext uri="{AF507438-7753-43e0-B8FC-AC1667EBCBE1}">
-              <a14:hiddenEffects xmlns:a14="http://schemas.microsoft.com/office/drawing/2010/main" xmlns="">
+              <a14:hiddenEffects xmlns="" xmlns:a14="http://schemas.microsoft.com/office/drawing/2010/main">
                 <a:effectLst>
                   <a:outerShdw dist="35921" dir="2700000" algn="ctr" rotWithShape="0">
                     <a:schemeClr val="bg2"/>
@@ -9926,66 +11122,6 @@
           </a:p>
         </p:txBody>
       </p:sp>
-      <p:pic>
-        <p:nvPicPr>
-          <p:cNvPr id="5" name="Image 4">
-            <a:extLst>
-              <a:ext uri="{FF2B5EF4-FFF2-40B4-BE49-F238E27FC236}">
-                <a16:creationId xmlns:a16="http://schemas.microsoft.com/office/drawing/2014/main" id="{813F397A-4869-49A1-6C23-7A30B2E1EB30}"/>
-              </a:ext>
-            </a:extLst>
-          </p:cNvPr>
-          <p:cNvPicPr>
-            <a:picLocks noChangeAspect="1"/>
-          </p:cNvPicPr>
-          <p:nvPr/>
-        </p:nvPicPr>
-        <p:blipFill>
-          <a:blip r:embed="rId2"/>
-          <a:stretch>
-            <a:fillRect/>
-          </a:stretch>
-        </p:blipFill>
-        <p:spPr>
-          <a:xfrm>
-            <a:off x="623393" y="3067352"/>
-            <a:ext cx="5688632" cy="3529999"/>
-          </a:xfrm>
-          <a:prstGeom prst="rect">
-            <a:avLst/>
-          </a:prstGeom>
-        </p:spPr>
-      </p:pic>
-      <p:pic>
-        <p:nvPicPr>
-          <p:cNvPr id="7" name="Image 6">
-            <a:extLst>
-              <a:ext uri="{FF2B5EF4-FFF2-40B4-BE49-F238E27FC236}">
-                <a16:creationId xmlns:a16="http://schemas.microsoft.com/office/drawing/2014/main" id="{A0974AEF-DD0A-A501-7699-E69364EBC6F3}"/>
-              </a:ext>
-            </a:extLst>
-          </p:cNvPr>
-          <p:cNvPicPr>
-            <a:picLocks noChangeAspect="1"/>
-          </p:cNvPicPr>
-          <p:nvPr/>
-        </p:nvPicPr>
-        <p:blipFill>
-          <a:blip r:embed="rId3"/>
-          <a:stretch>
-            <a:fillRect/>
-          </a:stretch>
-        </p:blipFill>
-        <p:spPr>
-          <a:xfrm>
-            <a:off x="7490332" y="2140868"/>
-            <a:ext cx="4701668" cy="1833090"/>
-          </a:xfrm>
-          <a:prstGeom prst="rect">
-            <a:avLst/>
-          </a:prstGeom>
-        </p:spPr>
-      </p:pic>
       <p:sp>
         <p:nvSpPr>
           <p:cNvPr id="8" name="Flèche : chevron 7">
@@ -10019,7 +11155,7 @@
           <a:effectLst/>
           <a:extLst>
             <a:ext uri="{AF507438-7753-43e0-B8FC-AC1667EBCBE1}">
-              <a14:hiddenEffects xmlns:a14="http://schemas.microsoft.com/office/drawing/2010/main" xmlns="">
+              <a14:hiddenEffects xmlns="" xmlns:a14="http://schemas.microsoft.com/office/drawing/2010/main">
                 <a:effectLst>
                   <a:outerShdw dist="35921" dir="2700000" algn="ctr" rotWithShape="0">
                     <a:schemeClr val="bg2"/>
@@ -10070,12 +11206,176 @@
           </a:p>
         </p:txBody>
       </p:sp>
+      <p:sp>
+        <p:nvSpPr>
+          <p:cNvPr id="10" name="ZoneTexte 9">
+            <a:extLst>
+              <a:ext uri="{FF2B5EF4-FFF2-40B4-BE49-F238E27FC236}">
+                <a16:creationId xmlns:a16="http://schemas.microsoft.com/office/drawing/2014/main" id="{D0BFD7B0-A009-0640-A151-7F9FBFFD3DD0}"/>
+              </a:ext>
+            </a:extLst>
+          </p:cNvPr>
+          <p:cNvSpPr txBox="1"/>
+          <p:nvPr/>
+        </p:nvSpPr>
+        <p:spPr>
+          <a:xfrm>
+            <a:off x="3287688" y="2615423"/>
+            <a:ext cx="1294028" cy="461665"/>
+          </a:xfrm>
+          <a:prstGeom prst="rect">
+            <a:avLst/>
+          </a:prstGeom>
+          <a:noFill/>
+        </p:spPr>
+        <p:txBody>
+          <a:bodyPr wrap="square">
+            <a:spAutoFit/>
+          </a:bodyPr>
+          <a:lstStyle/>
+          <a:p>
+            <a:r>
+              <a:rPr lang="fr-FR" sz="1200" dirty="0">
+                <a:solidFill>
+                  <a:srgbClr val="333333"/>
+                </a:solidFill>
+                <a:latin typeface="Calibri" panose="020F0502020204030204" pitchFamily="34" charset="0"/>
+              </a:rPr>
+              <a:t>Enquête 2025</a:t>
+            </a:r>
+          </a:p>
+          <a:p>
+            <a:r>
+              <a:rPr lang="fr-FR" sz="1200" dirty="0">
+                <a:solidFill>
+                  <a:srgbClr val="333333"/>
+                </a:solidFill>
+                <a:latin typeface="Calibri" panose="020F0502020204030204" pitchFamily="34" charset="0"/>
+              </a:rPr>
+              <a:t>Promo 2024</a:t>
+            </a:r>
+            <a:endParaRPr lang="fr-FR" sz="1200" dirty="0"/>
+          </a:p>
+        </p:txBody>
+      </p:sp>
+      <p:sp>
+        <p:nvSpPr>
+          <p:cNvPr id="12" name="ZoneTexte 11">
+            <a:extLst>
+              <a:ext uri="{FF2B5EF4-FFF2-40B4-BE49-F238E27FC236}">
+                <a16:creationId xmlns:a16="http://schemas.microsoft.com/office/drawing/2014/main" id="{B2B09F46-3B5A-23B3-21AE-F566686C20A7}"/>
+              </a:ext>
+            </a:extLst>
+          </p:cNvPr>
+          <p:cNvSpPr txBox="1"/>
+          <p:nvPr/>
+        </p:nvSpPr>
+        <p:spPr>
+          <a:xfrm>
+            <a:off x="4852256" y="2595748"/>
+            <a:ext cx="1294028" cy="461665"/>
+          </a:xfrm>
+          <a:prstGeom prst="rect">
+            <a:avLst/>
+          </a:prstGeom>
+          <a:noFill/>
+        </p:spPr>
+        <p:txBody>
+          <a:bodyPr wrap="square">
+            <a:spAutoFit/>
+          </a:bodyPr>
+          <a:lstStyle/>
+          <a:p>
+            <a:r>
+              <a:rPr lang="fr-FR" sz="1200" dirty="0">
+                <a:solidFill>
+                  <a:srgbClr val="333333"/>
+                </a:solidFill>
+                <a:latin typeface="Calibri" panose="020F0502020204030204" pitchFamily="34" charset="0"/>
+              </a:rPr>
+              <a:t>Enquête 2025</a:t>
+            </a:r>
+          </a:p>
+          <a:p>
+            <a:r>
+              <a:rPr lang="fr-FR" sz="1200" dirty="0">
+                <a:solidFill>
+                  <a:srgbClr val="333333"/>
+                </a:solidFill>
+                <a:latin typeface="Calibri" panose="020F0502020204030204" pitchFamily="34" charset="0"/>
+              </a:rPr>
+              <a:t>CGE 2024</a:t>
+            </a:r>
+            <a:endParaRPr lang="fr-FR" sz="1200" dirty="0"/>
+          </a:p>
+        </p:txBody>
+      </p:sp>
       <p:pic>
         <p:nvPicPr>
-          <p:cNvPr id="11" name="Image 10">
-            <a:extLst>
-              <a:ext uri="{FF2B5EF4-FFF2-40B4-BE49-F238E27FC236}">
-                <a16:creationId xmlns:a16="http://schemas.microsoft.com/office/drawing/2014/main" id="{807DBD71-38F8-EF26-DC6F-1E8B9FF6A7C2}"/>
+          <p:cNvPr id="6" name="Image 5">
+            <a:extLst>
+              <a:ext uri="{FF2B5EF4-FFF2-40B4-BE49-F238E27FC236}">
+                <a16:creationId xmlns:a16="http://schemas.microsoft.com/office/drawing/2014/main" id="{86C48D87-4DB0-FC43-E0AE-4FF1A05C41D4}"/>
+              </a:ext>
+            </a:extLst>
+          </p:cNvPr>
+          <p:cNvPicPr>
+            <a:picLocks noChangeAspect="1"/>
+          </p:cNvPicPr>
+          <p:nvPr/>
+        </p:nvPicPr>
+        <p:blipFill>
+          <a:blip r:embed="rId2"/>
+          <a:stretch>
+            <a:fillRect/>
+          </a:stretch>
+        </p:blipFill>
+        <p:spPr>
+          <a:xfrm>
+            <a:off x="449912" y="3185396"/>
+            <a:ext cx="5646088" cy="3360361"/>
+          </a:xfrm>
+          <a:prstGeom prst="rect">
+            <a:avLst/>
+          </a:prstGeom>
+        </p:spPr>
+      </p:pic>
+      <p:pic>
+        <p:nvPicPr>
+          <p:cNvPr id="14" name="Image 13">
+            <a:extLst>
+              <a:ext uri="{FF2B5EF4-FFF2-40B4-BE49-F238E27FC236}">
+                <a16:creationId xmlns:a16="http://schemas.microsoft.com/office/drawing/2014/main" id="{9E8A7F66-1973-802D-1848-2CD8115808FA}"/>
+              </a:ext>
+            </a:extLst>
+          </p:cNvPr>
+          <p:cNvPicPr>
+            <a:picLocks noChangeAspect="1"/>
+          </p:cNvPicPr>
+          <p:nvPr/>
+        </p:nvPicPr>
+        <p:blipFill>
+          <a:blip r:embed="rId3"/>
+          <a:stretch>
+            <a:fillRect/>
+          </a:stretch>
+        </p:blipFill>
+        <p:spPr>
+          <a:xfrm>
+            <a:off x="7104112" y="5024362"/>
+            <a:ext cx="4925705" cy="1521395"/>
+          </a:xfrm>
+          <a:prstGeom prst="rect">
+            <a:avLst/>
+          </a:prstGeom>
+        </p:spPr>
+      </p:pic>
+      <p:pic>
+        <p:nvPicPr>
+          <p:cNvPr id="20" name="Image 19">
+            <a:extLst>
+              <a:ext uri="{FF2B5EF4-FFF2-40B4-BE49-F238E27FC236}">
+                <a16:creationId xmlns:a16="http://schemas.microsoft.com/office/drawing/2014/main" id="{C6F58489-E5F7-5F22-8233-55BA11D2F7E7}"/>
               </a:ext>
             </a:extLst>
           </p:cNvPr>
@@ -10092,50 +11392,20 @@
         </p:blipFill>
         <p:spPr>
           <a:xfrm>
-            <a:off x="6325936" y="3057413"/>
-            <a:ext cx="1463723" cy="1739739"/>
+            <a:off x="7104111" y="2615423"/>
+            <a:ext cx="4925706" cy="1977860"/>
           </a:xfrm>
           <a:prstGeom prst="rect">
             <a:avLst/>
           </a:prstGeom>
         </p:spPr>
       </p:pic>
-      <p:pic>
-        <p:nvPicPr>
-          <p:cNvPr id="4" name="Image 3">
-            <a:extLst>
-              <a:ext uri="{FF2B5EF4-FFF2-40B4-BE49-F238E27FC236}">
-                <a16:creationId xmlns:a16="http://schemas.microsoft.com/office/drawing/2014/main" id="{46EB10B7-EF70-7500-9492-5CA15F80FB3D}"/>
-              </a:ext>
-            </a:extLst>
-          </p:cNvPr>
-          <p:cNvPicPr>
-            <a:picLocks noChangeAspect="1"/>
-          </p:cNvPicPr>
-          <p:nvPr/>
-        </p:nvPicPr>
-        <p:blipFill>
-          <a:blip r:embed="rId5"/>
-          <a:stretch>
-            <a:fillRect/>
-          </a:stretch>
-        </p:blipFill>
-        <p:spPr>
-          <a:xfrm>
-            <a:off x="6338581" y="4869160"/>
-            <a:ext cx="1413604" cy="1670623"/>
-          </a:xfrm>
-          <a:prstGeom prst="rect">
-            <a:avLst/>
-          </a:prstGeom>
-        </p:spPr>
-      </p:pic>
-      <p:sp>
-        <p:nvSpPr>
-          <p:cNvPr id="10" name="ZoneTexte 9">
-            <a:extLst>
-              <a:ext uri="{FF2B5EF4-FFF2-40B4-BE49-F238E27FC236}">
-                <a16:creationId xmlns:a16="http://schemas.microsoft.com/office/drawing/2014/main" id="{D0BFD7B0-A009-0640-A151-7F9FBFFD3DD0}"/>
+      <p:sp>
+        <p:nvSpPr>
+          <p:cNvPr id="21" name="ZoneTexte 20">
+            <a:extLst>
+              <a:ext uri="{FF2B5EF4-FFF2-40B4-BE49-F238E27FC236}">
+                <a16:creationId xmlns:a16="http://schemas.microsoft.com/office/drawing/2014/main" id="{E70FDAB2-C9C3-1275-2807-A9A524A6CC95}"/>
               </a:ext>
             </a:extLst>
           </p:cNvPr>
@@ -10144,8 +11414,8 @@
         </p:nvSpPr>
         <p:spPr>
           <a:xfrm>
-            <a:off x="3287688" y="2615423"/>
-            <a:ext cx="1294028" cy="461665"/>
+            <a:off x="7085720" y="2001396"/>
+            <a:ext cx="2754695" cy="276999"/>
           </a:xfrm>
           <a:prstGeom prst="rect">
             <a:avLst/>
@@ -10165,308 +11435,7 @@
                 </a:solidFill>
                 <a:latin typeface="Calibri" panose="020F0502020204030204" pitchFamily="34" charset="0"/>
               </a:rPr>
-              <a:t>Enquête 2024</a:t>
-            </a:r>
-          </a:p>
-          <a:p>
-            <a:r>
-              <a:rPr lang="fr-FR" sz="1200" dirty="0">
-                <a:solidFill>
-                  <a:srgbClr val="333333"/>
-                </a:solidFill>
-                <a:latin typeface="Calibri" panose="020F0502020204030204" pitchFamily="34" charset="0"/>
-              </a:rPr>
-              <a:t>Promo 2023</a:t>
-            </a:r>
-            <a:endParaRPr lang="fr-FR" sz="1200" dirty="0"/>
-          </a:p>
-        </p:txBody>
-      </p:sp>
-      <p:sp>
-        <p:nvSpPr>
-          <p:cNvPr id="12" name="ZoneTexte 11">
-            <a:extLst>
-              <a:ext uri="{FF2B5EF4-FFF2-40B4-BE49-F238E27FC236}">
-                <a16:creationId xmlns:a16="http://schemas.microsoft.com/office/drawing/2014/main" id="{B2B09F46-3B5A-23B3-21AE-F566686C20A7}"/>
-              </a:ext>
-            </a:extLst>
-          </p:cNvPr>
-          <p:cNvSpPr txBox="1"/>
-          <p:nvPr/>
-        </p:nvSpPr>
-        <p:spPr>
-          <a:xfrm>
-            <a:off x="4852256" y="2595748"/>
-            <a:ext cx="1294028" cy="461665"/>
-          </a:xfrm>
-          <a:prstGeom prst="rect">
-            <a:avLst/>
-          </a:prstGeom>
-          <a:noFill/>
-        </p:spPr>
-        <p:txBody>
-          <a:bodyPr wrap="square">
-            <a:spAutoFit/>
-          </a:bodyPr>
-          <a:lstStyle/>
-          <a:p>
-            <a:r>
-              <a:rPr lang="fr-FR" sz="1200" dirty="0">
-                <a:solidFill>
-                  <a:srgbClr val="333333"/>
-                </a:solidFill>
-                <a:latin typeface="Calibri" panose="020F0502020204030204" pitchFamily="34" charset="0"/>
-              </a:rPr>
-              <a:t>Enquête 2024</a:t>
-            </a:r>
-          </a:p>
-          <a:p>
-            <a:r>
-              <a:rPr lang="fr-FR" sz="1200" dirty="0">
-                <a:solidFill>
-                  <a:srgbClr val="333333"/>
-                </a:solidFill>
-                <a:latin typeface="Calibri" panose="020F0502020204030204" pitchFamily="34" charset="0"/>
-              </a:rPr>
-              <a:t>CGE 2023</a:t>
-            </a:r>
-            <a:endParaRPr lang="fr-FR" sz="1200" dirty="0"/>
-          </a:p>
-        </p:txBody>
-      </p:sp>
-      <p:sp>
-        <p:nvSpPr>
-          <p:cNvPr id="13" name="ZoneTexte 12">
-            <a:extLst>
-              <a:ext uri="{FF2B5EF4-FFF2-40B4-BE49-F238E27FC236}">
-                <a16:creationId xmlns:a16="http://schemas.microsoft.com/office/drawing/2014/main" id="{543FCDF0-1687-48D2-A629-90F2D261E784}"/>
-              </a:ext>
-            </a:extLst>
-          </p:cNvPr>
-          <p:cNvSpPr txBox="1"/>
-          <p:nvPr/>
-        </p:nvSpPr>
-        <p:spPr>
-          <a:xfrm>
-            <a:off x="6416824" y="2595747"/>
-            <a:ext cx="1294028" cy="461665"/>
-          </a:xfrm>
-          <a:prstGeom prst="rect">
-            <a:avLst/>
-          </a:prstGeom>
-          <a:noFill/>
-        </p:spPr>
-        <p:txBody>
-          <a:bodyPr wrap="square">
-            <a:spAutoFit/>
-          </a:bodyPr>
-          <a:lstStyle/>
-          <a:p>
-            <a:r>
-              <a:rPr lang="fr-FR" sz="1200" b="1" dirty="0">
-                <a:solidFill>
-                  <a:srgbClr val="333333"/>
-                </a:solidFill>
-                <a:latin typeface="Calibri" panose="020F0502020204030204" pitchFamily="34" charset="0"/>
-              </a:rPr>
-              <a:t>Enquête 2025</a:t>
-            </a:r>
-          </a:p>
-          <a:p>
-            <a:r>
-              <a:rPr lang="fr-FR" sz="1200" dirty="0">
-                <a:solidFill>
-                  <a:srgbClr val="333333"/>
-                </a:solidFill>
-                <a:latin typeface="Calibri" panose="020F0502020204030204" pitchFamily="34" charset="0"/>
-              </a:rPr>
-              <a:t>Promo 2024</a:t>
-            </a:r>
-            <a:endParaRPr lang="fr-FR" sz="1200" dirty="0"/>
-          </a:p>
-        </p:txBody>
-      </p:sp>
-      <p:pic>
-        <p:nvPicPr>
-          <p:cNvPr id="15" name="Image 14">
-            <a:extLst>
-              <a:ext uri="{FF2B5EF4-FFF2-40B4-BE49-F238E27FC236}">
-                <a16:creationId xmlns:a16="http://schemas.microsoft.com/office/drawing/2014/main" id="{A324F6BB-D777-341D-D19A-B01F95EE6C9F}"/>
-              </a:ext>
-            </a:extLst>
-          </p:cNvPr>
-          <p:cNvPicPr>
-            <a:picLocks noChangeAspect="1"/>
-          </p:cNvPicPr>
-          <p:nvPr/>
-        </p:nvPicPr>
-        <p:blipFill>
-          <a:blip r:embed="rId6"/>
-          <a:stretch>
-            <a:fillRect/>
-          </a:stretch>
-        </p:blipFill>
-        <p:spPr>
-          <a:xfrm>
-            <a:off x="10373399" y="4670363"/>
-            <a:ext cx="1209001" cy="1866528"/>
-          </a:xfrm>
-          <a:prstGeom prst="rect">
-            <a:avLst/>
-          </a:prstGeom>
-        </p:spPr>
-      </p:pic>
-      <p:sp>
-        <p:nvSpPr>
-          <p:cNvPr id="16" name="ZoneTexte 15">
-            <a:extLst>
-              <a:ext uri="{FF2B5EF4-FFF2-40B4-BE49-F238E27FC236}">
-                <a16:creationId xmlns:a16="http://schemas.microsoft.com/office/drawing/2014/main" id="{ED0FF9F4-E50C-8350-B196-3422B8A2EF14}"/>
-              </a:ext>
-            </a:extLst>
-          </p:cNvPr>
-          <p:cNvSpPr txBox="1"/>
-          <p:nvPr/>
-        </p:nvSpPr>
-        <p:spPr>
-          <a:xfrm>
-            <a:off x="9683871" y="1679203"/>
-            <a:ext cx="1294028" cy="461665"/>
-          </a:xfrm>
-          <a:prstGeom prst="rect">
-            <a:avLst/>
-          </a:prstGeom>
-          <a:noFill/>
-        </p:spPr>
-        <p:txBody>
-          <a:bodyPr wrap="square">
-            <a:spAutoFit/>
-          </a:bodyPr>
-          <a:lstStyle/>
-          <a:p>
-            <a:r>
-              <a:rPr lang="fr-FR" sz="1200" dirty="0">
-                <a:solidFill>
-                  <a:srgbClr val="333333"/>
-                </a:solidFill>
-                <a:latin typeface="Calibri" panose="020F0502020204030204" pitchFamily="34" charset="0"/>
-              </a:rPr>
-              <a:t>Enquête 2024</a:t>
-            </a:r>
-          </a:p>
-          <a:p>
-            <a:r>
-              <a:rPr lang="fr-FR" sz="1200" dirty="0">
-                <a:solidFill>
-                  <a:srgbClr val="333333"/>
-                </a:solidFill>
-                <a:latin typeface="Calibri" panose="020F0502020204030204" pitchFamily="34" charset="0"/>
-              </a:rPr>
-              <a:t>Promo 2023</a:t>
-            </a:r>
-            <a:endParaRPr lang="fr-FR" sz="1200" dirty="0"/>
-          </a:p>
-        </p:txBody>
-      </p:sp>
-      <p:sp>
-        <p:nvSpPr>
-          <p:cNvPr id="17" name="ZoneTexte 16">
-            <a:extLst>
-              <a:ext uri="{FF2B5EF4-FFF2-40B4-BE49-F238E27FC236}">
-                <a16:creationId xmlns:a16="http://schemas.microsoft.com/office/drawing/2014/main" id="{9BBA96EE-8769-5F39-538E-57D353B9AFDE}"/>
-              </a:ext>
-            </a:extLst>
-          </p:cNvPr>
-          <p:cNvSpPr txBox="1"/>
-          <p:nvPr/>
-        </p:nvSpPr>
-        <p:spPr>
-          <a:xfrm>
-            <a:off x="11020413" y="1679203"/>
-            <a:ext cx="1294028" cy="461665"/>
-          </a:xfrm>
-          <a:prstGeom prst="rect">
-            <a:avLst/>
-          </a:prstGeom>
-          <a:noFill/>
-        </p:spPr>
-        <p:txBody>
-          <a:bodyPr wrap="square">
-            <a:spAutoFit/>
-          </a:bodyPr>
-          <a:lstStyle/>
-          <a:p>
-            <a:r>
-              <a:rPr lang="fr-FR" sz="1200" dirty="0">
-                <a:solidFill>
-                  <a:srgbClr val="333333"/>
-                </a:solidFill>
-                <a:latin typeface="Calibri" panose="020F0502020204030204" pitchFamily="34" charset="0"/>
-              </a:rPr>
-              <a:t>Enquête 2024</a:t>
-            </a:r>
-          </a:p>
-          <a:p>
-            <a:r>
-              <a:rPr lang="fr-FR" sz="1200" dirty="0">
-                <a:solidFill>
-                  <a:srgbClr val="333333"/>
-                </a:solidFill>
-                <a:latin typeface="Calibri" panose="020F0502020204030204" pitchFamily="34" charset="0"/>
-              </a:rPr>
-              <a:t>CGE 2023</a:t>
-            </a:r>
-            <a:endParaRPr lang="fr-FR" sz="1200" dirty="0"/>
-          </a:p>
-        </p:txBody>
-      </p:sp>
-      <p:sp>
-        <p:nvSpPr>
-          <p:cNvPr id="18" name="ZoneTexte 17">
-            <a:extLst>
-              <a:ext uri="{FF2B5EF4-FFF2-40B4-BE49-F238E27FC236}">
-                <a16:creationId xmlns:a16="http://schemas.microsoft.com/office/drawing/2014/main" id="{FA559ACA-0014-F274-BE24-1DAB5A1A1E83}"/>
-              </a:ext>
-            </a:extLst>
-          </p:cNvPr>
-          <p:cNvSpPr txBox="1"/>
-          <p:nvPr/>
-        </p:nvSpPr>
-        <p:spPr>
-          <a:xfrm>
-            <a:off x="10408572" y="4204790"/>
-            <a:ext cx="1294028" cy="461665"/>
-          </a:xfrm>
-          <a:prstGeom prst="rect">
-            <a:avLst/>
-          </a:prstGeom>
-          <a:noFill/>
-        </p:spPr>
-        <p:txBody>
-          <a:bodyPr wrap="square">
-            <a:spAutoFit/>
-          </a:bodyPr>
-          <a:lstStyle/>
-          <a:p>
-            <a:r>
-              <a:rPr lang="fr-FR" sz="1200" b="1" dirty="0">
-                <a:solidFill>
-                  <a:srgbClr val="333333"/>
-                </a:solidFill>
-                <a:latin typeface="Calibri" panose="020F0502020204030204" pitchFamily="34" charset="0"/>
-              </a:rPr>
-              <a:t>Enquête 2025</a:t>
-            </a:r>
-          </a:p>
-          <a:p>
-            <a:r>
-              <a:rPr lang="fr-FR" sz="1200" dirty="0">
-                <a:solidFill>
-                  <a:srgbClr val="333333"/>
-                </a:solidFill>
-                <a:latin typeface="Calibri" panose="020F0502020204030204" pitchFamily="34" charset="0"/>
-              </a:rPr>
-              <a:t>Promo 2024</a:t>
+              <a:t>Salaires bruts / en France</a:t>
             </a:r>
             <a:endParaRPr lang="fr-FR" sz="1200" dirty="0"/>
           </a:p>
@@ -10569,7 +11538,7 @@
           <a:effectLst/>
           <a:extLst>
             <a:ext uri="{AF507438-7753-43e0-B8FC-AC1667EBCBE1}">
-              <a14:hiddenEffects xmlns="" xmlns:a14="http://schemas.microsoft.com/office/drawing/2010/main">
+              <a14:hiddenEffects xmlns:a14="http://schemas.microsoft.com/office/drawing/2010/main" xmlns="">
                 <a:effectLst>
                   <a:outerShdw dist="35921" dir="2700000" algn="ctr" rotWithShape="0">
                     <a:schemeClr val="bg2"/>
@@ -10855,6 +11824,43 @@
           </a:p>
         </p:txBody>
       </p:sp>
+      <p:cxnSp>
+        <p:nvCxnSpPr>
+          <p:cNvPr id="4" name="Connecteur droit 3">
+            <a:extLst>
+              <a:ext uri="{FF2B5EF4-FFF2-40B4-BE49-F238E27FC236}">
+                <a16:creationId xmlns:a16="http://schemas.microsoft.com/office/drawing/2014/main" id="{74D59C6E-6AD8-71D2-D6BE-493FEBD67B51}"/>
+              </a:ext>
+            </a:extLst>
+          </p:cNvPr>
+          <p:cNvCxnSpPr>
+            <a:cxnSpLocks/>
+          </p:cNvCxnSpPr>
+          <p:nvPr/>
+        </p:nvCxnSpPr>
+        <p:spPr bwMode="auto">
+          <a:xfrm>
+            <a:off x="6528048" y="3212976"/>
+            <a:ext cx="0" cy="3321571"/>
+          </a:xfrm>
+          <a:prstGeom prst="line">
+            <a:avLst/>
+          </a:prstGeom>
+          <a:solidFill>
+            <a:schemeClr val="accent1"/>
+          </a:solidFill>
+          <a:ln w="57150" cap="flat" cmpd="sng" algn="ctr">
+            <a:solidFill>
+              <a:srgbClr val="002060"/>
+            </a:solidFill>
+            <a:prstDash val="solid"/>
+            <a:round/>
+            <a:headEnd type="none" w="med" len="med"/>
+            <a:tailEnd type="none" w="med" len="med"/>
+          </a:ln>
+          <a:effectLst/>
+        </p:spPr>
+      </p:cxnSp>
     </p:spTree>
     <p:extLst>
       <p:ext uri="{BB962C8B-B14F-4D97-AF65-F5344CB8AC3E}">
@@ -10952,7 +11958,7 @@
           <a:effectLst/>
           <a:extLst>
             <a:ext uri="{AF507438-7753-43e0-B8FC-AC1667EBCBE1}">
-              <a14:hiddenEffects xmlns:a14="http://schemas.microsoft.com/office/drawing/2010/main" xmlns="">
+              <a14:hiddenEffects xmlns="" xmlns:a14="http://schemas.microsoft.com/office/drawing/2010/main">
                 <a:effectLst>
                   <a:outerShdw dist="35921" dir="2700000" algn="ctr" rotWithShape="0">
                     <a:schemeClr val="bg2"/>
@@ -11188,7 +12194,7 @@
           <a:effectLst/>
           <a:extLst>
             <a:ext uri="{AF507438-7753-43e0-B8FC-AC1667EBCBE1}">
-              <a14:hiddenEffects xmlns="" xmlns:a14="http://schemas.microsoft.com/office/drawing/2010/main">
+              <a14:hiddenEffects xmlns:a14="http://schemas.microsoft.com/office/drawing/2010/main" xmlns="">
                 <a:effectLst>
                   <a:outerShdw dist="35921" dir="2700000" algn="ctr" rotWithShape="0">
                     <a:schemeClr val="bg2"/>
@@ -11525,7 +12531,7 @@
           <a:effectLst/>
           <a:extLst>
             <a:ext uri="{AF507438-7753-43e0-B8FC-AC1667EBCBE1}">
-              <a14:hiddenEffects xmlns:a14="http://schemas.microsoft.com/office/drawing/2010/main" xmlns="">
+              <a14:hiddenEffects xmlns="" xmlns:a14="http://schemas.microsoft.com/office/drawing/2010/main">
                 <a:effectLst>
                   <a:outerShdw dist="35921" dir="2700000" algn="ctr" rotWithShape="0">
                     <a:schemeClr val="bg2"/>
@@ -12295,90 +13301,6 @@
               <a:latin typeface="Arial" charset="0"/>
               <a:ea typeface="MS PGothic" pitchFamily="34" charset="-128"/>
             </a:endParaRPr>
-          </a:p>
-        </p:txBody>
-      </p:sp>
-      <p:sp>
-        <p:nvSpPr>
-          <p:cNvPr id="12" name="Flèche : chevron 11">
-            <a:extLst>
-              <a:ext uri="{FF2B5EF4-FFF2-40B4-BE49-F238E27FC236}">
-                <a16:creationId xmlns:a16="http://schemas.microsoft.com/office/drawing/2014/main" id="{F80DFC1C-A407-4925-C139-C4A3551657D4}"/>
-              </a:ext>
-            </a:extLst>
-          </p:cNvPr>
-          <p:cNvSpPr/>
-          <p:nvPr/>
-        </p:nvSpPr>
-        <p:spPr bwMode="auto">
-          <a:xfrm>
-            <a:off x="5375920" y="5753356"/>
-            <a:ext cx="4536504" cy="307777"/>
-          </a:xfrm>
-          <a:prstGeom prst="chevron">
-            <a:avLst/>
-          </a:prstGeom>
-          <a:solidFill>
-            <a:srgbClr val="FF960A"/>
-          </a:solidFill>
-          <a:ln w="9525" cap="flat" cmpd="sng" algn="ctr">
-            <a:noFill/>
-            <a:prstDash val="solid"/>
-            <a:round/>
-            <a:headEnd type="none" w="med" len="med"/>
-            <a:tailEnd type="none" w="med" len="med"/>
-          </a:ln>
-          <a:effectLst/>
-          <a:extLst>
-            <a:ext uri="{AF507438-7753-43e0-B8FC-AC1667EBCBE1}">
-              <a14:hiddenEffects xmlns:a14="http://schemas.microsoft.com/office/drawing/2010/main" xmlns="">
-                <a:effectLst>
-                  <a:outerShdw dist="35921" dir="2700000" algn="ctr" rotWithShape="0">
-                    <a:schemeClr val="bg2"/>
-                  </a:outerShdw>
-                </a:effectLst>
-              </a14:hiddenEffects>
-            </a:ext>
-          </a:extLst>
-        </p:spPr>
-        <p:txBody>
-          <a:bodyPr vert="horz" wrap="square" lIns="91440" tIns="45720" rIns="91440" bIns="45720" numCol="1" rtlCol="0" anchor="t" anchorCtr="0" compatLnSpc="1">
-            <a:prstTxWarp prst="textNoShape">
-              <a:avLst/>
-            </a:prstTxWarp>
-          </a:bodyPr>
-          <a:lstStyle/>
-          <a:p>
-            <a:pPr marL="0" marR="0" indent="0" algn="ctr" defTabSz="914400" rtl="0" eaLnBrk="0" fontAlgn="base" latinLnBrk="0" hangingPunct="0">
-              <a:lnSpc>
-                <a:spcPct val="100000"/>
-              </a:lnSpc>
-              <a:spcBef>
-                <a:spcPct val="0"/>
-              </a:spcBef>
-              <a:spcAft>
-                <a:spcPct val="0"/>
-              </a:spcAft>
-              <a:buClrTx/>
-              <a:buSzTx/>
-              <a:buFontTx/>
-              <a:buNone/>
-              <a:tabLst/>
-            </a:pPr>
-            <a:r>
-              <a:rPr kumimoji="0" lang="fr-FR" b="1" i="0" u="none" strike="noStrike" cap="none" normalizeH="0" baseline="0" dirty="0">
-                <a:ln>
-                  <a:noFill/>
-                </a:ln>
-                <a:solidFill>
-                  <a:schemeClr val="bg1"/>
-                </a:solidFill>
-                <a:effectLst/>
-                <a:latin typeface="Arial" charset="0"/>
-                <a:ea typeface="ＭＳ Ｐゴシック" pitchFamily="1" charset="-128"/>
-              </a:rPr>
-              <a:t>Revoir l’insertion à l’IOGS / FHP</a:t>
-            </a:r>
           </a:p>
         </p:txBody>
       </p:sp>
@@ -12479,7 +13401,7 @@
           <a:effectLst/>
           <a:extLst>
             <a:ext uri="{AF507438-7753-43e0-B8FC-AC1667EBCBE1}">
-              <a14:hiddenEffects xmlns="" xmlns:a14="http://schemas.microsoft.com/office/drawing/2010/main">
+              <a14:hiddenEffects xmlns:a14="http://schemas.microsoft.com/office/drawing/2010/main" xmlns="">
                 <a:effectLst>
                   <a:outerShdw dist="35921" dir="2700000" algn="ctr" rotWithShape="0">
                     <a:schemeClr val="bg2"/>

</xml_diff>